<commit_message>
Update for details of exam
Exam update
</commit_message>
<xml_diff>
--- a/cits1003-lecture_slides/CITS1003-0 Overview.pptx
+++ b/cits1003-lecture_slides/CITS1003-0 Overview.pptx
@@ -5395,7 +5395,7 @@
           <a:p>
             <a:fld id="{6D6D7260-B7E4-B548-BD1F-84ED14536037}" type="datetimeFigureOut">
               <a:rPr lang="en-AU" smtClean="0"/>
-              <a:t>24/7/2024</a:t>
+              <a:t>6/10/2024</a:t>
             </a:fld>
             <a:endParaRPr lang="en-AU"/>
           </a:p>
@@ -7125,7 +7125,7 @@
           <a:p>
             <a:fld id="{88D38747-4367-4BD2-8D51-C97E202738E2}" type="datetime1">
               <a:rPr lang="en-US" smtClean="0"/>
-              <a:t>7/24/24</a:t>
+              <a:t>10/6/24</a:t>
             </a:fld>
             <a:endParaRPr lang="en-US" dirty="0"/>
           </a:p>
@@ -7430,7 +7430,7 @@
           <a:p>
             <a:fld id="{11F1B079-7EF0-44EE-B798-BCC497C9F3B2}" type="datetime1">
               <a:rPr lang="en-US" smtClean="0"/>
-              <a:t>7/24/24</a:t>
+              <a:t>10/6/24</a:t>
             </a:fld>
             <a:endParaRPr lang="en-US" dirty="0"/>
           </a:p>
@@ -7624,7 +7624,7 @@
           <a:p>
             <a:fld id="{28FF70A8-1D13-4657-95F0-A9EA54967B8D}" type="datetime1">
               <a:rPr lang="en-US" smtClean="0"/>
-              <a:t>7/24/24</a:t>
+              <a:t>10/6/24</a:t>
             </a:fld>
             <a:endParaRPr lang="en-US" dirty="0"/>
           </a:p>
@@ -7887,7 +7887,7 @@
           <a:p>
             <a:fld id="{21EB90AC-71BD-4C7F-8ACA-7B3F18292E63}" type="datetime1">
               <a:rPr lang="en-US" smtClean="0"/>
-              <a:t>7/24/24</a:t>
+              <a:t>10/6/24</a:t>
             </a:fld>
             <a:endParaRPr lang="en-US" dirty="0"/>
           </a:p>
@@ -8323,7 +8323,7 @@
           <a:p>
             <a:fld id="{4E6EFC2C-8905-46F0-B443-CE905B76BA01}" type="datetime1">
               <a:rPr lang="en-US" smtClean="0"/>
-              <a:t>7/24/24</a:t>
+              <a:t>10/6/24</a:t>
             </a:fld>
             <a:endParaRPr lang="en-US" dirty="0"/>
           </a:p>
@@ -8860,7 +8860,7 @@
           <a:p>
             <a:fld id="{D9079DC3-C9B5-499E-9140-0DC28B7074E2}" type="datetime1">
               <a:rPr lang="en-US" smtClean="0"/>
-              <a:t>7/24/24</a:t>
+              <a:t>10/6/24</a:t>
             </a:fld>
             <a:endParaRPr lang="en-US" dirty="0"/>
           </a:p>
@@ -9742,7 +9742,7 @@
           <a:p>
             <a:fld id="{30BB33EA-E472-4D22-9C03-A9C14AA21CED}" type="datetime1">
               <a:rPr lang="en-US" smtClean="0"/>
-              <a:t>7/24/24</a:t>
+              <a:t>10/6/24</a:t>
             </a:fld>
             <a:endParaRPr lang="en-US" dirty="0"/>
           </a:p>
@@ -9912,7 +9912,7 @@
           <a:p>
             <a:fld id="{217E833E-1B6D-415F-AD29-75AE8C43BD0D}" type="datetime1">
               <a:rPr lang="en-US" smtClean="0"/>
-              <a:t>7/24/24</a:t>
+              <a:t>10/6/24</a:t>
             </a:fld>
             <a:endParaRPr lang="en-US" dirty="0"/>
           </a:p>
@@ -10096,7 +10096,7 @@
           <a:p>
             <a:fld id="{8452596F-08A7-4B70-989A-F2B1CF31E66B}" type="datetime1">
               <a:rPr lang="en-US" smtClean="0"/>
-              <a:t>7/24/24</a:t>
+              <a:t>10/6/24</a:t>
             </a:fld>
             <a:endParaRPr lang="en-US" dirty="0"/>
           </a:p>
@@ -10266,7 +10266,7 @@
           <a:p>
             <a:fld id="{73C55A3C-5767-4844-A0A3-83778C2E5409}" type="datetime1">
               <a:rPr lang="en-US" smtClean="0"/>
-              <a:t>7/24/24</a:t>
+              <a:t>10/6/24</a:t>
             </a:fld>
             <a:endParaRPr lang="en-US" dirty="0"/>
           </a:p>
@@ -10510,7 +10510,7 @@
           <a:p>
             <a:fld id="{CAE507A8-A5CF-4D38-AB86-7EDDA87A85D4}" type="datetime1">
               <a:rPr lang="en-US" smtClean="0"/>
-              <a:t>7/24/24</a:t>
+              <a:t>10/6/24</a:t>
             </a:fld>
             <a:endParaRPr lang="en-US" dirty="0"/>
           </a:p>
@@ -10752,7 +10752,7 @@
           <a:p>
             <a:fld id="{BDFCD27C-8599-43EF-BA1D-14DDC1946E06}" type="datetime1">
               <a:rPr lang="en-US" smtClean="0"/>
-              <a:t>7/24/24</a:t>
+              <a:t>10/6/24</a:t>
             </a:fld>
             <a:endParaRPr lang="en-US" dirty="0"/>
           </a:p>
@@ -11233,7 +11233,7 @@
           <a:p>
             <a:fld id="{49343D99-809A-49C0-96E5-4250D0B498EE}" type="datetime1">
               <a:rPr lang="en-US" smtClean="0"/>
-              <a:t>7/24/24</a:t>
+              <a:t>10/6/24</a:t>
             </a:fld>
             <a:endParaRPr lang="en-US" dirty="0"/>
           </a:p>
@@ -11351,7 +11351,7 @@
           <a:p>
             <a:fld id="{A143DE9B-B678-4EFB-BB7D-A4370204A0B0}" type="datetime1">
               <a:rPr lang="en-US" smtClean="0"/>
-              <a:t>7/24/24</a:t>
+              <a:t>10/6/24</a:t>
             </a:fld>
             <a:endParaRPr lang="en-US" dirty="0"/>
           </a:p>
@@ -11446,7 +11446,7 @@
           <a:p>
             <a:fld id="{E68812DA-F765-4142-A6A3-A8ED7235E082}" type="datetime1">
               <a:rPr lang="en-US" smtClean="0"/>
-              <a:t>7/24/24</a:t>
+              <a:t>10/6/24</a:t>
             </a:fld>
             <a:endParaRPr lang="en-US" dirty="0"/>
           </a:p>
@@ -11701,7 +11701,7 @@
           <a:p>
             <a:fld id="{3E0277FD-7DE6-41D4-930D-AC99F5AFE54E}" type="datetime1">
               <a:rPr lang="en-US" smtClean="0"/>
-              <a:t>7/24/24</a:t>
+              <a:t>10/6/24</a:t>
             </a:fld>
             <a:endParaRPr lang="en-US" dirty="0"/>
           </a:p>
@@ -12008,7 +12008,7 @@
           <a:p>
             <a:fld id="{9EA15526-7079-4B7B-987C-1B5FAE11A0FF}" type="datetime1">
               <a:rPr lang="en-US" smtClean="0"/>
-              <a:t>7/24/24</a:t>
+              <a:t>10/6/24</a:t>
             </a:fld>
             <a:endParaRPr lang="en-US" dirty="0"/>
           </a:p>
@@ -12243,7 +12243,7 @@
           <a:p>
             <a:fld id="{073ED0CC-082F-4160-86E5-0D6041F12778}" type="datetime1">
               <a:rPr lang="en-US" smtClean="0"/>
-              <a:t>7/24/24</a:t>
+              <a:t>10/6/24</a:t>
             </a:fld>
             <a:endParaRPr lang="en-US" dirty="0"/>
           </a:p>
@@ -13154,7 +13154,7 @@
           </a:effectLst>
           <a:extLst>
             <a:ext uri="{91240B29-F687-4f45-9708-019B960494DF}">
-              <a14:hiddenLine xmlns:a14="http://schemas.microsoft.com/office/drawing/2010/main" xmlns="" w="9525">
+              <a14:hiddenLine xmlns="" xmlns:a14="http://schemas.microsoft.com/office/drawing/2010/main" w="9525">
                 <a:solidFill>
                   <a:srgbClr val="000000"/>
                 </a:solidFill>
@@ -13726,7 +13726,7 @@
                 <a:latin typeface="Arial" panose="020B0604020202020204" pitchFamily="34" charset="0"/>
                 <a:cs typeface="Arial" panose="020B0604020202020204" pitchFamily="34" charset="0"/>
               </a:rPr>
-              <a:t>Project will be released in Week 6 (tentative) and end in Week 11 (tentative). This will be similar in format to the labs – except without the guidance part</a:t>
+              <a:t>Project will be released in Week 6 (tentative) and end in Week 12. This will be similar in format to the labs – except without the guidance part</a:t>
             </a:r>
           </a:p>
           <a:p>
@@ -13755,17 +13755,7 @@
                 <a:latin typeface="Arial" panose="020B0604020202020204" pitchFamily="34" charset="0"/>
                 <a:cs typeface="Arial" panose="020B0604020202020204" pitchFamily="34" charset="0"/>
               </a:rPr>
-              <a:t>Exam overview will be done in week 12.</a:t>
-            </a:r>
-          </a:p>
-          <a:p>
-            <a:pPr lvl="1"/>
-            <a:r>
-              <a:rPr lang="en-AU" sz="2000" dirty="0">
-                <a:latin typeface="Arial" panose="020B0604020202020204" pitchFamily="34" charset="0"/>
-                <a:cs typeface="Arial" panose="020B0604020202020204" pitchFamily="34" charset="0"/>
-              </a:rPr>
-              <a:t>Exam can be assisted by open-book notes without electronic materials</a:t>
+              <a:t>Exam does not allow external material i.e. it is closed book</a:t>
             </a:r>
           </a:p>
         </p:txBody>

</xml_diff>